<commit_message>
Fixed GLSL errors in 03-14 slides
</commit_message>
<xml_diff>
--- a/lectures/03-14-GLSL-Intro.pptx
+++ b/lectures/03-14-GLSL-Intro.pptx
@@ -7874,7 +7874,16 @@
               <a:rPr lang="en-US" dirty="0">
                 <a:latin typeface="Courier New" pitchFamily="49" charset="0"/>
               </a:rPr>
-              <a:t>(program);  // Later: pass uniform variables</a:t>
+              <a:t>(program);  </a:t>
+            </a:r>
+            <a:r>
+              <a:rPr lang="en-US" dirty="0">
+                <a:solidFill>
+                  <a:srgbClr val="00B050"/>
+                </a:solidFill>
+                <a:latin typeface="Courier New" pitchFamily="49" charset="0"/>
+              </a:rPr>
+              <a:t>// Later: pass uniform variables</a:t>
             </a:r>
           </a:p>
           <a:p>
@@ -12940,11 +12949,7 @@
             </a:pPr>
             <a:r>
               <a:rPr lang="en-US" sz="2800" dirty="0" smtClean="0"/>
-              <a:t>Classi</a:t>
-            </a:r>
-            <a:r>
-              <a:rPr lang="en-US" sz="2800" dirty="0" smtClean="0"/>
-              <a:t>c OpenGL 2 / OpenGL ES 2 / WebGL / Direct3D 9 Pipeline</a:t>
+              <a:t>Classic OpenGL 2 / OpenGL ES 2 / WebGL / Direct3D 9 Pipeline</a:t>
             </a:r>
           </a:p>
           <a:p>
@@ -13346,35 +13351,17 @@
               <a:rPr lang="en-US" sz="1400" dirty="0">
                 <a:latin typeface="Courier New" pitchFamily="49" charset="0"/>
               </a:rPr>
-              <a:t> </a:t>
-            </a:r>
-            <a:r>
-              <a:rPr lang="en-US" sz="1400" dirty="0">
-                <a:latin typeface="Courier New" pitchFamily="49" charset="0"/>
-              </a:rPr>
-              <a:t>* </a:t>
+              <a:t> * </a:t>
             </a:r>
             <a:r>
               <a:rPr lang="en-US" sz="1400" dirty="0" smtClean="0">
-                <a:solidFill>
-                  <a:srgbClr val="0000FF"/>
-                </a:solidFill>
-                <a:latin typeface="Courier New" pitchFamily="49" charset="0"/>
-              </a:rPr>
-              <a:t>vec4</a:t>
-            </a:r>
-            <a:r>
-              <a:rPr lang="en-US" sz="1400" dirty="0" smtClean="0">
-                <a:latin typeface="Courier New" pitchFamily="49" charset="0"/>
-              </a:rPr>
-              <a:t>(position</a:t>
-            </a:r>
-            <a:r>
-              <a:rPr lang="en-US" sz="1400" dirty="0">
-                <a:latin typeface="Courier New" pitchFamily="49" charset="0"/>
-              </a:rPr>
-              <a:t>, 1.0);</a:t>
-            </a:r>
+                <a:latin typeface="Courier New" pitchFamily="49" charset="0"/>
+              </a:rPr>
+              <a:t>position;</a:t>
+            </a:r>
+            <a:endParaRPr lang="en-US" sz="1400" dirty="0">
+              <a:latin typeface="Courier New" pitchFamily="49" charset="0"/>
+            </a:endParaRPr>
           </a:p>
           <a:p>
             <a:pPr marL="342900" indent="-342900" eaLnBrk="1" hangingPunct="1">
@@ -14201,7 +14188,6 @@
               <a:rPr lang="en-US" dirty="0" smtClean="0"/>
               <a:t>Homework 4 will be released 03/19</a:t>
             </a:r>
-            <a:endParaRPr lang="en-US" dirty="0" smtClean="0"/>
           </a:p>
           <a:p>
             <a:pPr marL="0" indent="0" eaLnBrk="1" hangingPunct="1">
@@ -14457,29 +14443,26 @@
               <a:t>attribute </a:t>
             </a:r>
             <a:r>
+              <a:rPr lang="en-US" sz="1400" dirty="0" smtClean="0">
+                <a:solidFill>
+                  <a:srgbClr val="0000FF"/>
+                </a:solidFill>
+                <a:latin typeface="Courier New" pitchFamily="49" charset="0"/>
+              </a:rPr>
+              <a:t>vec4</a:t>
+            </a:r>
+            <a:r>
+              <a:rPr lang="en-US" sz="1400" dirty="0" smtClean="0">
+                <a:latin typeface="Courier New" pitchFamily="49" charset="0"/>
+              </a:rPr>
+              <a:t> </a:t>
+            </a:r>
+            <a:r>
               <a:rPr lang="en-US" sz="1400" dirty="0">
-                <a:solidFill>
-                  <a:srgbClr val="0000FF"/>
-                </a:solidFill>
-                <a:latin typeface="Courier New" pitchFamily="49" charset="0"/>
-              </a:rPr>
-              <a:t>vec3</a:t>
-            </a:r>
-            <a:r>
-              <a:rPr lang="en-US" sz="1400" dirty="0">
-                <a:latin typeface="Courier New" pitchFamily="49" charset="0"/>
-              </a:rPr>
-              <a:t> </a:t>
-            </a:r>
-            <a:r>
-              <a:rPr lang="en-US" sz="1400" dirty="0">
                 <a:latin typeface="Courier New" pitchFamily="49" charset="0"/>
               </a:rPr>
               <a:t>position;</a:t>
             </a:r>
-            <a:endParaRPr lang="en-US" sz="1400" dirty="0">
-              <a:latin typeface="Courier New" pitchFamily="49" charset="0"/>
-            </a:endParaRPr>
           </a:p>
           <a:p>
             <a:pPr marL="342900" indent="-342900" eaLnBrk="1" hangingPunct="1">
@@ -14749,35 +14732,17 @@
               <a:rPr lang="en-US" sz="1400" dirty="0">
                 <a:latin typeface="Courier New" pitchFamily="49" charset="0"/>
               </a:rPr>
-              <a:t> </a:t>
-            </a:r>
-            <a:r>
-              <a:rPr lang="en-US" sz="1400" dirty="0">
-                <a:latin typeface="Courier New" pitchFamily="49" charset="0"/>
-              </a:rPr>
-              <a:t>* </a:t>
+              <a:t> * </a:t>
             </a:r>
             <a:r>
               <a:rPr lang="en-US" sz="1400" dirty="0" smtClean="0">
-                <a:solidFill>
-                  <a:srgbClr val="0000FF"/>
-                </a:solidFill>
-                <a:latin typeface="Courier New" pitchFamily="49" charset="0"/>
-              </a:rPr>
-              <a:t>vec4</a:t>
-            </a:r>
-            <a:r>
-              <a:rPr lang="en-US" sz="1400" dirty="0" smtClean="0">
-                <a:latin typeface="Courier New" pitchFamily="49" charset="0"/>
-              </a:rPr>
-              <a:t>(position</a:t>
-            </a:r>
-            <a:r>
-              <a:rPr lang="en-US" sz="1400" dirty="0">
-                <a:latin typeface="Courier New" pitchFamily="49" charset="0"/>
-              </a:rPr>
-              <a:t>, 1.0);</a:t>
-            </a:r>
+                <a:latin typeface="Courier New" pitchFamily="49" charset="0"/>
+              </a:rPr>
+              <a:t>position;</a:t>
+            </a:r>
+            <a:endParaRPr lang="en-US" sz="1400" dirty="0">
+              <a:latin typeface="Courier New" pitchFamily="49" charset="0"/>
+            </a:endParaRPr>
           </a:p>
           <a:p>
             <a:pPr marL="342900" indent="-342900" eaLnBrk="1" hangingPunct="1">
@@ -15920,19 +15885,25 @@
               <a:t>= </a:t>
             </a:r>
             <a:r>
+              <a:rPr lang="en-US" sz="1400" dirty="0" smtClean="0">
+                <a:solidFill>
+                  <a:srgbClr val="0000FF"/>
+                </a:solidFill>
+                <a:latin typeface="Courier New" pitchFamily="49" charset="0"/>
+              </a:rPr>
+              <a:t>vec4</a:t>
+            </a:r>
+            <a:r>
+              <a:rPr lang="en-US" sz="1400" dirty="0" smtClean="0">
+                <a:latin typeface="Courier New" pitchFamily="49" charset="0"/>
+              </a:rPr>
+              <a:t>(1.0</a:t>
+            </a:r>
+            <a:r>
               <a:rPr lang="en-US" sz="1400" dirty="0">
-                <a:solidFill>
-                  <a:srgbClr val="0000FF"/>
-                </a:solidFill>
-                <a:latin typeface="Courier New" pitchFamily="49" charset="0"/>
-              </a:rPr>
-              <a:t>vec3</a:t>
-            </a:r>
-            <a:r>
-              <a:rPr lang="en-US" sz="1400" dirty="0">
-                <a:latin typeface="Courier New" pitchFamily="49" charset="0"/>
-              </a:rPr>
-              <a:t>(1.0, 0.0, </a:t>
+                <a:latin typeface="Courier New" pitchFamily="49" charset="0"/>
+              </a:rPr>
+              <a:t>, 0.0, </a:t>
             </a:r>
             <a:r>
               <a:rPr lang="en-US" sz="1400" dirty="0" smtClean="0">
@@ -16769,16 +16740,7 @@
                 </a:solidFill>
                 <a:latin typeface="Courier New" pitchFamily="49" charset="0"/>
               </a:rPr>
-              <a:t>varying</a:t>
-            </a:r>
-            <a:r>
-              <a:rPr lang="en-US" sz="1400" dirty="0" smtClean="0">
-                <a:solidFill>
-                  <a:srgbClr val="0000FF"/>
-                </a:solidFill>
-                <a:latin typeface="Courier New" pitchFamily="49" charset="0"/>
-              </a:rPr>
-              <a:t> </a:t>
+              <a:t>varying </a:t>
             </a:r>
             <a:r>
               <a:rPr lang="en-US" sz="1400" dirty="0">
@@ -16932,17 +16894,41 @@
               <a:t>= </a:t>
             </a:r>
             <a:r>
+              <a:rPr lang="en-US" sz="1400" dirty="0" smtClean="0">
+                <a:solidFill>
+                  <a:srgbClr val="0000FF"/>
+                </a:solidFill>
+                <a:latin typeface="Courier New" pitchFamily="49" charset="0"/>
+              </a:rPr>
+              <a:t>vec4</a:t>
+            </a:r>
+            <a:r>
+              <a:rPr lang="en-US" sz="1400" dirty="0" smtClean="0">
+                <a:latin typeface="Courier New" pitchFamily="49" charset="0"/>
+              </a:rPr>
+              <a:t>(</a:t>
+            </a:r>
+            <a:r>
               <a:rPr lang="en-US" sz="1400" dirty="0" err="1" smtClean="0">
                 <a:latin typeface="Courier New" pitchFamily="49" charset="0"/>
               </a:rPr>
               <a:t>fs_color</a:t>
             </a:r>
             <a:r>
-              <a:rPr lang="en-US" sz="1400" dirty="0">
+              <a:rPr lang="en-US" sz="1400" dirty="0" smtClean="0">
+                <a:latin typeface="Courier New" pitchFamily="49" charset="0"/>
+              </a:rPr>
+              <a:t>, 1.0)</a:t>
+            </a:r>
+            <a:r>
+              <a:rPr lang="en-US" sz="1400" dirty="0" smtClean="0">
                 <a:latin typeface="Courier New" pitchFamily="49" charset="0"/>
               </a:rPr>
               <a:t>;</a:t>
             </a:r>
+            <a:endParaRPr lang="en-US" sz="1400" dirty="0">
+              <a:latin typeface="Courier New" pitchFamily="49" charset="0"/>
+            </a:endParaRPr>
           </a:p>
           <a:p>
             <a:pPr marL="342900" indent="-342900" eaLnBrk="1" hangingPunct="1">
@@ -23026,13 +23012,28 @@
                 </a:solidFill>
                 <a:latin typeface="Courier New" pitchFamily="49" charset="0"/>
               </a:rPr>
-              <a:t>attribute vec3</a:t>
+              <a:t>attribute </a:t>
+            </a:r>
+            <a:r>
+              <a:rPr lang="en-US" dirty="0" smtClean="0">
+                <a:solidFill>
+                  <a:srgbClr val="0000FF"/>
+                </a:solidFill>
+                <a:latin typeface="Courier New" pitchFamily="49" charset="0"/>
+              </a:rPr>
+              <a:t>vec4</a:t>
+            </a:r>
+            <a:r>
+              <a:rPr lang="en-US" dirty="0" smtClean="0">
+                <a:latin typeface="Courier New" pitchFamily="49" charset="0"/>
+              </a:rPr>
+              <a:t> </a:t>
             </a:r>
             <a:r>
               <a:rPr lang="en-US" dirty="0">
                 <a:latin typeface="Courier New" pitchFamily="49" charset="0"/>
               </a:rPr>
-              <a:t> position;</a:t>
+              <a:t>position;</a:t>
             </a:r>
           </a:p>
           <a:p>
@@ -23258,20 +23259,14 @@
               <a:t> * </a:t>
             </a:r>
             <a:r>
-              <a:rPr lang="en-US" dirty="0">
-                <a:solidFill>
-                  <a:srgbClr val="0000FF"/>
-                </a:solidFill>
-                <a:latin typeface="Courier New" pitchFamily="49" charset="0"/>
-              </a:rPr>
-              <a:t>vec4</a:t>
-            </a:r>
-            <a:r>
-              <a:rPr lang="en-US" dirty="0">
-                <a:latin typeface="Courier New" pitchFamily="49" charset="0"/>
-              </a:rPr>
-              <a:t>(position, 1.0);</a:t>
-            </a:r>
+              <a:rPr lang="en-US" dirty="0" smtClean="0">
+                <a:latin typeface="Courier New" pitchFamily="49" charset="0"/>
+              </a:rPr>
+              <a:t>position;</a:t>
+            </a:r>
+            <a:endParaRPr lang="en-US" dirty="0">
+              <a:latin typeface="Courier New" pitchFamily="49" charset="0"/>
+            </a:endParaRPr>
           </a:p>
           <a:p>
             <a:pPr marL="342900" indent="-342900" eaLnBrk="1" hangingPunct="1">
@@ -24288,12 +24283,6 @@
               </a:rPr>
               <a:t>.</a:t>
             </a:r>
-            <a:endParaRPr lang="en-US" sz="1400" dirty="0">
-              <a:solidFill>
-                <a:srgbClr val="009900"/>
-              </a:solidFill>
-              <a:latin typeface="Courier New" pitchFamily="49" charset="0"/>
-            </a:endParaRPr>
           </a:p>
           <a:p>
             <a:pPr marL="342900" indent="-342900"/>
@@ -32309,7 +32298,7 @@
           <a:p>
             <a:pPr marL="342900" indent="-342900"/>
             <a:r>
-              <a:rPr lang="en-US" sz="1400">
+              <a:rPr lang="en-US" sz="1400" dirty="0">
                 <a:solidFill>
                   <a:srgbClr val="0000FF"/>
                 </a:solidFill>
@@ -32318,13 +32307,13 @@
               <a:t>vec3 </a:t>
             </a:r>
             <a:r>
-              <a:rPr lang="en-US" sz="1400">
+              <a:rPr lang="en-US" sz="1400" dirty="0">
                 <a:latin typeface="Courier New" pitchFamily="49" charset="0"/>
               </a:rPr>
               <a:t>p = </a:t>
             </a:r>
             <a:r>
-              <a:rPr lang="en-US" sz="1400">
+              <a:rPr lang="en-US" sz="1400" dirty="0">
                 <a:solidFill>
                   <a:srgbClr val="0000FF"/>
                 </a:solidFill>
@@ -32333,7 +32322,7 @@
               <a:t>vec3</a:t>
             </a:r>
             <a:r>
-              <a:rPr lang="en-US" sz="1400">
+              <a:rPr lang="en-US" sz="1400" dirty="0">
                 <a:latin typeface="Courier New" pitchFamily="49" charset="0"/>
               </a:rPr>
               <a:t>(1.0, 2.0, 3.0);</a:t>
@@ -32342,7 +32331,7 @@
           <a:p>
             <a:pPr marL="342900" indent="-342900"/>
             <a:r>
-              <a:rPr lang="en-US" sz="1400">
+              <a:rPr lang="en-US" sz="1400" dirty="0">
                 <a:solidFill>
                   <a:srgbClr val="0000FF"/>
                 </a:solidFill>
@@ -32351,13 +32340,13 @@
               <a:t>vec3 </a:t>
             </a:r>
             <a:r>
-              <a:rPr lang="en-US" sz="1400">
+              <a:rPr lang="en-US" sz="1400" dirty="0">
                 <a:latin typeface="Courier New" pitchFamily="49" charset="0"/>
               </a:rPr>
               <a:t>q = </a:t>
             </a:r>
             <a:r>
-              <a:rPr lang="en-US" sz="1400">
+              <a:rPr lang="en-US" sz="1400" dirty="0">
                 <a:solidFill>
                   <a:srgbClr val="0000FF"/>
                 </a:solidFill>
@@ -32366,7 +32355,7 @@
               <a:t>vec3</a:t>
             </a:r>
             <a:r>
-              <a:rPr lang="en-US" sz="1400">
+              <a:rPr lang="en-US" sz="1400" dirty="0">
                 <a:latin typeface="Courier New" pitchFamily="49" charset="0"/>
               </a:rPr>
               <a:t>(3.0, 2.0, 1.0);</a:t>
@@ -32374,7 +32363,7 @@
           </a:p>
           <a:p>
             <a:pPr marL="342900" indent="-342900"/>
-            <a:endParaRPr lang="en-US" sz="1400">
+            <a:endParaRPr lang="en-US" sz="1400" dirty="0">
               <a:solidFill>
                 <a:srgbClr val="0000FF"/>
               </a:solidFill>
@@ -32384,7 +32373,7 @@
           <a:p>
             <a:pPr marL="342900" indent="-342900"/>
             <a:r>
-              <a:rPr lang="en-US" sz="1400">
+              <a:rPr lang="en-US" sz="1400" dirty="0">
                 <a:solidFill>
                   <a:srgbClr val="0000FF"/>
                 </a:solidFill>
@@ -32393,13 +32382,13 @@
               <a:t>bvec3 </a:t>
             </a:r>
             <a:r>
-              <a:rPr lang="en-US" sz="1400">
+              <a:rPr lang="en-US" sz="1400" dirty="0">
                 <a:latin typeface="Courier New" pitchFamily="49" charset="0"/>
               </a:rPr>
               <a:t>b = </a:t>
             </a:r>
             <a:r>
-              <a:rPr lang="en-US" sz="1400">
+              <a:rPr lang="en-US" sz="1400" dirty="0">
                 <a:solidFill>
                   <a:srgbClr val="CC0066"/>
                 </a:solidFill>
@@ -32408,13 +32397,13 @@
               <a:t>equal</a:t>
             </a:r>
             <a:r>
-              <a:rPr lang="en-US" sz="1400">
+              <a:rPr lang="en-US" sz="1400" dirty="0">
                 <a:latin typeface="Courier New" pitchFamily="49" charset="0"/>
               </a:rPr>
               <a:t>(p, q);        </a:t>
             </a:r>
             <a:r>
-              <a:rPr lang="en-US" sz="1400">
+              <a:rPr lang="en-US" sz="1400" dirty="0">
                 <a:solidFill>
                   <a:srgbClr val="009900"/>
                 </a:solidFill>
@@ -32426,7 +32415,7 @@
           <a:p>
             <a:pPr marL="342900" indent="-342900"/>
             <a:r>
-              <a:rPr lang="en-US" sz="1400">
+              <a:rPr lang="en-US" sz="1400" dirty="0">
                 <a:solidFill>
                   <a:srgbClr val="0000FF"/>
                 </a:solidFill>
@@ -32435,13 +32424,13 @@
               <a:t>bvec3 </a:t>
             </a:r>
             <a:r>
-              <a:rPr lang="en-US" sz="1400">
+              <a:rPr lang="en-US" sz="1400" dirty="0">
                 <a:latin typeface="Courier New" pitchFamily="49" charset="0"/>
               </a:rPr>
               <a:t>b2 = </a:t>
             </a:r>
             <a:r>
-              <a:rPr lang="en-US" sz="1400">
+              <a:rPr lang="en-US" sz="1400" dirty="0" err="1">
                 <a:solidFill>
                   <a:srgbClr val="CC0066"/>
                 </a:solidFill>
@@ -32450,13 +32439,13 @@
               <a:t>lessThan</a:t>
             </a:r>
             <a:r>
-              <a:rPr lang="en-US" sz="1400">
+              <a:rPr lang="en-US" sz="1400" dirty="0">
                 <a:latin typeface="Courier New" pitchFamily="49" charset="0"/>
               </a:rPr>
               <a:t>(p, q);    </a:t>
             </a:r>
             <a:r>
-              <a:rPr lang="en-US" sz="1400">
+              <a:rPr lang="en-US" sz="1400" dirty="0">
                 <a:solidFill>
                   <a:srgbClr val="009900"/>
                 </a:solidFill>
@@ -32468,7 +32457,7 @@
           <a:p>
             <a:pPr marL="342900" indent="-342900"/>
             <a:r>
-              <a:rPr lang="en-US" sz="1400">
+              <a:rPr lang="en-US" sz="1400" dirty="0">
                 <a:solidFill>
                   <a:srgbClr val="0000FF"/>
                 </a:solidFill>
@@ -32477,13 +32466,13 @@
               <a:t>bvec3 </a:t>
             </a:r>
             <a:r>
-              <a:rPr lang="en-US" sz="1400">
+              <a:rPr lang="en-US" sz="1400" dirty="0">
                 <a:latin typeface="Courier New" pitchFamily="49" charset="0"/>
               </a:rPr>
               <a:t>b3 = </a:t>
             </a:r>
             <a:r>
-              <a:rPr lang="en-US" sz="1400">
+              <a:rPr lang="en-US" sz="1400" dirty="0" err="1">
                 <a:solidFill>
                   <a:srgbClr val="CC0066"/>
                 </a:solidFill>
@@ -32492,13 +32481,13 @@
               <a:t>greaterThan</a:t>
             </a:r>
             <a:r>
-              <a:rPr lang="en-US" sz="1400">
+              <a:rPr lang="en-US" sz="1400" dirty="0">
                 <a:latin typeface="Courier New" pitchFamily="49" charset="0"/>
               </a:rPr>
               <a:t>(p, q); </a:t>
             </a:r>
             <a:r>
-              <a:rPr lang="en-US" sz="1400">
+              <a:rPr lang="en-US" sz="1400" dirty="0">
                 <a:solidFill>
                   <a:srgbClr val="009900"/>
                 </a:solidFill>
@@ -32509,7 +32498,7 @@
           </a:p>
           <a:p>
             <a:pPr marL="342900" indent="-342900"/>
-            <a:endParaRPr lang="en-US" sz="1400">
+            <a:endParaRPr lang="en-US" sz="1400" dirty="0">
               <a:solidFill>
                 <a:srgbClr val="009900"/>
               </a:solidFill>
@@ -32519,90 +32508,99 @@
           <a:p>
             <a:pPr marL="342900" indent="-342900"/>
             <a:r>
+              <a:rPr lang="en-US" sz="1400" dirty="0" err="1" smtClean="0">
+                <a:solidFill>
+                  <a:srgbClr val="0000FF"/>
+                </a:solidFill>
+                <a:latin typeface="Courier New" pitchFamily="49" charset="0"/>
+              </a:rPr>
+              <a:t>bool</a:t>
+            </a:r>
+            <a:r>
+              <a:rPr lang="en-US" sz="1400" dirty="0" smtClean="0">
+                <a:solidFill>
+                  <a:srgbClr val="0000FF"/>
+                </a:solidFill>
+                <a:latin typeface="Courier New" pitchFamily="49" charset="0"/>
+              </a:rPr>
+              <a:t> </a:t>
+            </a:r>
+            <a:r>
+              <a:rPr lang="en-US" sz="1400" dirty="0">
+                <a:latin typeface="Courier New" pitchFamily="49" charset="0"/>
+              </a:rPr>
+              <a:t>b4 = </a:t>
+            </a:r>
+            <a:r>
+              <a:rPr lang="en-US" sz="1400" dirty="0">
+                <a:solidFill>
+                  <a:srgbClr val="CC0066"/>
+                </a:solidFill>
+                <a:latin typeface="Courier New" pitchFamily="49" charset="0"/>
+              </a:rPr>
+              <a:t>any</a:t>
+            </a:r>
+            <a:r>
+              <a:rPr lang="en-US" sz="1400" dirty="0">
+                <a:latin typeface="Courier New" pitchFamily="49" charset="0"/>
+              </a:rPr>
+              <a:t>(b);            </a:t>
+            </a:r>
+            <a:r>
+              <a:rPr lang="en-US" sz="1400" dirty="0">
+                <a:solidFill>
+                  <a:srgbClr val="009900"/>
+                </a:solidFill>
+                <a:latin typeface="Courier New" pitchFamily="49" charset="0"/>
+              </a:rPr>
+              <a:t>// true</a:t>
+            </a:r>
+          </a:p>
+          <a:p>
+            <a:pPr marL="342900" indent="-342900"/>
+            <a:r>
               <a:rPr lang="en-US" sz="1400">
                 <a:solidFill>
                   <a:srgbClr val="0000FF"/>
                 </a:solidFill>
                 <a:latin typeface="Courier New" pitchFamily="49" charset="0"/>
               </a:rPr>
-              <a:t>bvec3 </a:t>
-            </a:r>
-            <a:r>
-              <a:rPr lang="en-US" sz="1400">
-                <a:latin typeface="Courier New" pitchFamily="49" charset="0"/>
-              </a:rPr>
-              <a:t>b4 = </a:t>
-            </a:r>
-            <a:r>
-              <a:rPr lang="en-US" sz="1400">
+              <a:t>bool </a:t>
+            </a:r>
+            <a:r>
+              <a:rPr lang="en-US" sz="1400" dirty="0">
+                <a:latin typeface="Courier New" pitchFamily="49" charset="0"/>
+              </a:rPr>
+              <a:t>b5 = </a:t>
+            </a:r>
+            <a:r>
+              <a:rPr lang="en-US" sz="1400" dirty="0">
                 <a:solidFill>
                   <a:srgbClr val="CC0066"/>
                 </a:solidFill>
                 <a:latin typeface="Courier New" pitchFamily="49" charset="0"/>
               </a:rPr>
-              <a:t>any</a:t>
-            </a:r>
-            <a:r>
-              <a:rPr lang="en-US" sz="1400">
+              <a:t>all</a:t>
+            </a:r>
+            <a:r>
+              <a:rPr lang="en-US" sz="1400" dirty="0">
                 <a:latin typeface="Courier New" pitchFamily="49" charset="0"/>
               </a:rPr>
               <a:t>(b);            </a:t>
             </a:r>
             <a:r>
-              <a:rPr lang="en-US" sz="1400">
+              <a:rPr lang="en-US" sz="1400" dirty="0">
                 <a:solidFill>
                   <a:srgbClr val="009900"/>
                 </a:solidFill>
                 <a:latin typeface="Courier New" pitchFamily="49" charset="0"/>
               </a:rPr>
-              <a:t>// true</a:t>
+              <a:t>// false</a:t>
             </a:r>
           </a:p>
           <a:p>
             <a:pPr marL="342900" indent="-342900"/>
-            <a:r>
-              <a:rPr lang="en-US" sz="1400">
-                <a:solidFill>
-                  <a:srgbClr val="0000FF"/>
-                </a:solidFill>
-                <a:latin typeface="Courier New" pitchFamily="49" charset="0"/>
-              </a:rPr>
-              <a:t>bvec3 </a:t>
-            </a:r>
-            <a:r>
-              <a:rPr lang="en-US" sz="1400">
-                <a:latin typeface="Courier New" pitchFamily="49" charset="0"/>
-              </a:rPr>
-              <a:t>b5 = </a:t>
-            </a:r>
-            <a:r>
-              <a:rPr lang="en-US" sz="1400">
-                <a:solidFill>
-                  <a:srgbClr val="CC0066"/>
-                </a:solidFill>
-                <a:latin typeface="Courier New" pitchFamily="49" charset="0"/>
-              </a:rPr>
-              <a:t>all</a:t>
-            </a:r>
-            <a:r>
-              <a:rPr lang="en-US" sz="1400">
-                <a:latin typeface="Courier New" pitchFamily="49" charset="0"/>
-              </a:rPr>
-              <a:t>(b);            </a:t>
-            </a:r>
-            <a:r>
-              <a:rPr lang="en-US" sz="1400">
-                <a:solidFill>
-                  <a:srgbClr val="009900"/>
-                </a:solidFill>
-                <a:latin typeface="Courier New" pitchFamily="49" charset="0"/>
-              </a:rPr>
-              <a:t>// false</a:t>
-            </a:r>
-          </a:p>
-          <a:p>
-            <a:pPr marL="342900" indent="-342900"/>
-            <a:endParaRPr lang="en-US" sz="1400">
+            <a:endParaRPr lang="en-US" sz="1400" dirty="0">
               <a:solidFill>
                 <a:srgbClr val="009900"/>
               </a:solidFill>
@@ -32611,7 +32609,7 @@
           </a:p>
           <a:p>
             <a:pPr marL="342900" indent="-342900"/>
-            <a:endParaRPr lang="en-US" sz="1400">
+            <a:endParaRPr lang="en-US" sz="1400" dirty="0">
               <a:solidFill>
                 <a:srgbClr val="009900"/>
               </a:solidFill>

</xml_diff>